<commit_message>
Final before submitting to MSSQLTIPS.com
</commit_message>
<xml_diff>
--- a/CreateHybridEnvironmentForSSISDevelopment/HybridSSISEnvironmentDiagram.pptx
+++ b/CreateHybridEnvironmentForSSISDevelopment/HybridSSISEnvironmentDiagram.pptx
@@ -105,6 +105,11 @@
       </a:defRPr>
     </a:lvl9pPr>
   </p:defaultTextStyle>
+  <p:extLst>
+    <p:ext uri="{EFAFB233-063F-42B5-8137-9DF3F51BA10A}">
+      <p15:sldGuideLst xmlns:p15="http://schemas.microsoft.com/office/powerpoint/2012/main"/>
+    </p:ext>
+  </p:extLst>
 </p:presentation>
 </file>
 
@@ -3404,31 +3409,6 @@
       </p:grpSpPr>
       <p:sp>
         <p:nvSpPr>
-          <p:cNvPr id="2" name="Title 1">
-            <a:extLst>
-              <a:ext uri="{FF2B5EF4-FFF2-40B4-BE49-F238E27FC236}">
-                <a16:creationId xmlns:a16="http://schemas.microsoft.com/office/drawing/2014/main" id="{41C8C483-D014-4856-BC07-CA6B0A4F3BB5}"/>
-              </a:ext>
-            </a:extLst>
-          </p:cNvPr>
-          <p:cNvSpPr>
-            <a:spLocks noGrp="1"/>
-          </p:cNvSpPr>
-          <p:nvPr>
-            <p:ph type="title"/>
-          </p:nvPr>
-        </p:nvSpPr>
-        <p:spPr/>
-        <p:txBody>
-          <a:bodyPr/>
-          <a:lstStyle/>
-          <a:p>
-            <a:endParaRPr lang="en-US"/>
-          </a:p>
-        </p:txBody>
-      </p:sp>
-      <p:sp>
-        <p:nvSpPr>
           <p:cNvPr id="4" name="Flowchart: Magnetic Disk 3">
             <a:extLst>
               <a:ext uri="{FF2B5EF4-FFF2-40B4-BE49-F238E27FC236}">
@@ -3441,8 +3421,8 @@
         </p:nvSpPr>
         <p:spPr>
           <a:xfrm>
-            <a:off x="7853082" y="2194559"/>
-            <a:ext cx="1979408" cy="2614108"/>
+            <a:off x="7853081" y="3067113"/>
+            <a:ext cx="1979408" cy="2194559"/>
           </a:xfrm>
           <a:prstGeom prst="flowChartMagneticDisk">
             <a:avLst/>
@@ -3488,7 +3468,7 @@
         </p:nvSpPr>
         <p:spPr>
           <a:xfrm>
-            <a:off x="3958814" y="2838830"/>
+            <a:off x="3958813" y="3291836"/>
             <a:ext cx="2323652" cy="1325563"/>
           </a:xfrm>
           <a:prstGeom prst="rect">
@@ -3535,7 +3515,7 @@
         </p:nvSpPr>
         <p:spPr>
           <a:xfrm>
-            <a:off x="303007" y="2838830"/>
+            <a:off x="303006" y="3291836"/>
             <a:ext cx="2323652" cy="1325563"/>
           </a:xfrm>
           <a:prstGeom prst="rect">
@@ -3582,7 +3562,7 @@
         </p:nvSpPr>
         <p:spPr>
           <a:xfrm>
-            <a:off x="3958814" y="5433216"/>
+            <a:off x="3958812" y="5280181"/>
             <a:ext cx="2323652" cy="1325563"/>
           </a:xfrm>
           <a:prstGeom prst="rect">
@@ -3617,48 +3597,6 @@
       </p:sp>
       <p:cxnSp>
         <p:nvCxnSpPr>
-          <p:cNvPr id="9" name="Straight Arrow Connector 8">
-            <a:extLst>
-              <a:ext uri="{FF2B5EF4-FFF2-40B4-BE49-F238E27FC236}">
-                <a16:creationId xmlns:a16="http://schemas.microsoft.com/office/drawing/2014/main" id="{59A41A05-6204-4F5C-A4F2-8A15E83A0BA7}"/>
-              </a:ext>
-            </a:extLst>
-          </p:cNvPr>
-          <p:cNvCxnSpPr>
-            <a:stCxn id="6" idx="3"/>
-            <a:endCxn id="5" idx="1"/>
-          </p:cNvCxnSpPr>
-          <p:nvPr/>
-        </p:nvCxnSpPr>
-        <p:spPr>
-          <a:xfrm>
-            <a:off x="2626659" y="3501612"/>
-            <a:ext cx="1332155" cy="0"/>
-          </a:xfrm>
-          <a:prstGeom prst="straightConnector1">
-            <a:avLst/>
-          </a:prstGeom>
-          <a:ln>
-            <a:tailEnd type="triangle"/>
-          </a:ln>
-        </p:spPr>
-        <p:style>
-          <a:lnRef idx="1">
-            <a:schemeClr val="accent1"/>
-          </a:lnRef>
-          <a:fillRef idx="0">
-            <a:schemeClr val="accent1"/>
-          </a:fillRef>
-          <a:effectRef idx="0">
-            <a:schemeClr val="accent1"/>
-          </a:effectRef>
-          <a:fontRef idx="minor">
-            <a:schemeClr val="tx1"/>
-          </a:fontRef>
-        </p:style>
-      </p:cxnSp>
-      <p:cxnSp>
-        <p:nvCxnSpPr>
           <p:cNvPr id="11" name="Straight Arrow Connector 10">
             <a:extLst>
               <a:ext uri="{FF2B5EF4-FFF2-40B4-BE49-F238E27FC236}">
@@ -3675,8 +3613,8 @@
         </p:nvCxnSpPr>
         <p:spPr>
           <a:xfrm flipV="1">
-            <a:off x="6282466" y="4808667"/>
-            <a:ext cx="2560320" cy="1287331"/>
+            <a:off x="6282464" y="5261672"/>
+            <a:ext cx="2560321" cy="681291"/>
           </a:xfrm>
           <a:prstGeom prst="straightConnector1">
             <a:avLst/>
@@ -3717,7 +3655,7 @@
         </p:nvCxnSpPr>
         <p:spPr>
           <a:xfrm>
-            <a:off x="5120640" y="4164393"/>
+            <a:off x="5120639" y="4617399"/>
             <a:ext cx="0" cy="0"/>
           </a:xfrm>
           <a:prstGeom prst="straightConnector1">
@@ -3760,9 +3698,9 @@
           <p:nvPr/>
         </p:nvCxnSpPr>
         <p:spPr>
-          <a:xfrm>
-            <a:off x="5120640" y="4164393"/>
-            <a:ext cx="0" cy="1268823"/>
+          <a:xfrm flipH="1">
+            <a:off x="5120638" y="4617399"/>
+            <a:ext cx="1" cy="662782"/>
           </a:xfrm>
           <a:prstGeom prst="straightConnector1">
             <a:avLst/>
@@ -3800,7 +3738,7 @@
         </p:nvSpPr>
         <p:spPr>
           <a:xfrm>
-            <a:off x="505609" y="3195021"/>
+            <a:off x="523537" y="3572454"/>
             <a:ext cx="1882589" cy="646331"/>
           </a:xfrm>
           <a:prstGeom prst="rect">
@@ -3836,7 +3774,7 @@
         </p:nvSpPr>
         <p:spPr>
           <a:xfrm>
-            <a:off x="4098663" y="3316945"/>
+            <a:off x="4098661" y="3717120"/>
             <a:ext cx="2043953" cy="369332"/>
           </a:xfrm>
           <a:prstGeom prst="rect">
@@ -3872,8 +3810,8 @@
         </p:nvSpPr>
         <p:spPr>
           <a:xfrm>
-            <a:off x="8003689" y="3429000"/>
-            <a:ext cx="1688951" cy="646331"/>
+            <a:off x="7998309" y="3916799"/>
+            <a:ext cx="1688951" cy="923330"/>
           </a:xfrm>
           <a:prstGeom prst="rect">
             <a:avLst/>
@@ -3892,6 +3830,13 @@
               <a:t>Azure SQL Database</a:t>
             </a:r>
           </a:p>
+          <a:p>
+            <a:pPr algn="ctr"/>
+            <a:r>
+              <a:rPr lang="en-US" dirty="0"/>
+              <a:t>staging</a:t>
+            </a:r>
+          </a:p>
         </p:txBody>
       </p:sp>
       <p:sp>
@@ -3908,7 +3853,7 @@
         </p:nvSpPr>
         <p:spPr>
           <a:xfrm>
-            <a:off x="4098663" y="5712311"/>
+            <a:off x="4052047" y="5619797"/>
             <a:ext cx="2043953" cy="646331"/>
           </a:xfrm>
           <a:prstGeom prst="rect">
@@ -3930,6 +3875,296 @@
           </a:p>
         </p:txBody>
       </p:sp>
+      <p:sp>
+        <p:nvSpPr>
+          <p:cNvPr id="16" name="Flowchart: Magnetic Disk 15">
+            <a:extLst>
+              <a:ext uri="{FF2B5EF4-FFF2-40B4-BE49-F238E27FC236}">
+                <a16:creationId xmlns:a16="http://schemas.microsoft.com/office/drawing/2014/main" id="{C3EB1BAC-6127-4365-8C06-BB5E68BB0E2F}"/>
+              </a:ext>
+            </a:extLst>
+          </p:cNvPr>
+          <p:cNvSpPr/>
+          <p:nvPr/>
+        </p:nvSpPr>
+        <p:spPr>
+          <a:xfrm>
+            <a:off x="475129" y="733646"/>
+            <a:ext cx="1979408" cy="1880461"/>
+          </a:xfrm>
+          <a:prstGeom prst="flowChartMagneticDisk">
+            <a:avLst/>
+          </a:prstGeom>
+          <a:noFill/>
+        </p:spPr>
+        <p:style>
+          <a:lnRef idx="2">
+            <a:schemeClr val="accent1">
+              <a:shade val="50000"/>
+            </a:schemeClr>
+          </a:lnRef>
+          <a:fillRef idx="1">
+            <a:schemeClr val="accent1"/>
+          </a:fillRef>
+          <a:effectRef idx="0">
+            <a:schemeClr val="accent1"/>
+          </a:effectRef>
+          <a:fontRef idx="minor">
+            <a:schemeClr val="lt1"/>
+          </a:fontRef>
+        </p:style>
+        <p:txBody>
+          <a:bodyPr rtlCol="0" anchor="ctr"/>
+          <a:lstStyle/>
+          <a:p>
+            <a:pPr algn="ctr"/>
+            <a:endParaRPr lang="en-US"/>
+          </a:p>
+        </p:txBody>
+      </p:sp>
+      <p:sp>
+        <p:nvSpPr>
+          <p:cNvPr id="13" name="TextBox 12">
+            <a:extLst>
+              <a:ext uri="{FF2B5EF4-FFF2-40B4-BE49-F238E27FC236}">
+                <a16:creationId xmlns:a16="http://schemas.microsoft.com/office/drawing/2014/main" id="{C50E0769-547B-44A4-ABD3-5577CB09962D}"/>
+              </a:ext>
+            </a:extLst>
+          </p:cNvPr>
+          <p:cNvSpPr txBox="1"/>
+          <p:nvPr/>
+        </p:nvSpPr>
+        <p:spPr>
+          <a:xfrm>
+            <a:off x="523536" y="1562986"/>
+            <a:ext cx="2103121" cy="646331"/>
+          </a:xfrm>
+          <a:prstGeom prst="rect">
+            <a:avLst/>
+          </a:prstGeom>
+          <a:noFill/>
+        </p:spPr>
+        <p:txBody>
+          <a:bodyPr wrap="square" rtlCol="0">
+            <a:spAutoFit/>
+          </a:bodyPr>
+          <a:lstStyle/>
+          <a:p>
+            <a:r>
+              <a:rPr lang="en-US" dirty="0"/>
+              <a:t>Azure SQL Database AdventureWorksLT</a:t>
+            </a:r>
+          </a:p>
+        </p:txBody>
+      </p:sp>
+      <p:cxnSp>
+        <p:nvCxnSpPr>
+          <p:cNvPr id="24" name="Straight Arrow Connector 23">
+            <a:extLst>
+              <a:ext uri="{FF2B5EF4-FFF2-40B4-BE49-F238E27FC236}">
+                <a16:creationId xmlns:a16="http://schemas.microsoft.com/office/drawing/2014/main" id="{C098E0D2-C944-4F78-9820-24458FD773F1}"/>
+              </a:ext>
+            </a:extLst>
+          </p:cNvPr>
+          <p:cNvCxnSpPr>
+            <a:stCxn id="6" idx="0"/>
+            <a:endCxn id="16" idx="3"/>
+          </p:cNvCxnSpPr>
+          <p:nvPr/>
+        </p:nvCxnSpPr>
+        <p:spPr>
+          <a:xfrm flipV="1">
+            <a:off x="1464832" y="2614107"/>
+            <a:ext cx="1" cy="677729"/>
+          </a:xfrm>
+          <a:prstGeom prst="straightConnector1">
+            <a:avLst/>
+          </a:prstGeom>
+          <a:ln>
+            <a:tailEnd type="triangle"/>
+          </a:ln>
+        </p:spPr>
+        <p:style>
+          <a:lnRef idx="1">
+            <a:schemeClr val="accent1"/>
+          </a:lnRef>
+          <a:fillRef idx="0">
+            <a:schemeClr val="accent1"/>
+          </a:fillRef>
+          <a:effectRef idx="0">
+            <a:schemeClr val="accent1"/>
+          </a:effectRef>
+          <a:fontRef idx="minor">
+            <a:schemeClr val="tx1"/>
+          </a:fontRef>
+        </p:style>
+      </p:cxnSp>
+      <p:sp>
+        <p:nvSpPr>
+          <p:cNvPr id="25" name="Rectangle 24">
+            <a:extLst>
+              <a:ext uri="{FF2B5EF4-FFF2-40B4-BE49-F238E27FC236}">
+                <a16:creationId xmlns:a16="http://schemas.microsoft.com/office/drawing/2014/main" id="{667498D7-75E4-4C99-8EB6-6B463A3BC3BF}"/>
+              </a:ext>
+            </a:extLst>
+          </p:cNvPr>
+          <p:cNvSpPr/>
+          <p:nvPr/>
+        </p:nvSpPr>
+        <p:spPr>
+          <a:xfrm>
+            <a:off x="3958811" y="1223369"/>
+            <a:ext cx="2323652" cy="1325563"/>
+          </a:xfrm>
+          <a:prstGeom prst="rect">
+            <a:avLst/>
+          </a:prstGeom>
+          <a:noFill/>
+        </p:spPr>
+        <p:style>
+          <a:lnRef idx="2">
+            <a:schemeClr val="accent1">
+              <a:shade val="50000"/>
+            </a:schemeClr>
+          </a:lnRef>
+          <a:fillRef idx="1">
+            <a:schemeClr val="accent1"/>
+          </a:fillRef>
+          <a:effectRef idx="0">
+            <a:schemeClr val="accent1"/>
+          </a:effectRef>
+          <a:fontRef idx="minor">
+            <a:schemeClr val="lt1"/>
+          </a:fontRef>
+        </p:style>
+        <p:txBody>
+          <a:bodyPr rtlCol="0" anchor="ctr"/>
+          <a:lstStyle/>
+          <a:p>
+            <a:pPr algn="ctr"/>
+            <a:endParaRPr lang="en-US"/>
+          </a:p>
+        </p:txBody>
+      </p:sp>
+      <p:sp>
+        <p:nvSpPr>
+          <p:cNvPr id="26" name="TextBox 25">
+            <a:extLst>
+              <a:ext uri="{FF2B5EF4-FFF2-40B4-BE49-F238E27FC236}">
+                <a16:creationId xmlns:a16="http://schemas.microsoft.com/office/drawing/2014/main" id="{65421EA2-EECC-491A-821D-B9F8C920F21F}"/>
+              </a:ext>
+            </a:extLst>
+          </p:cNvPr>
+          <p:cNvSpPr txBox="1"/>
+          <p:nvPr/>
+        </p:nvSpPr>
+        <p:spPr>
+          <a:xfrm>
+            <a:off x="4130931" y="1562984"/>
+            <a:ext cx="2043953" cy="646331"/>
+          </a:xfrm>
+          <a:prstGeom prst="rect">
+            <a:avLst/>
+          </a:prstGeom>
+          <a:noFill/>
+        </p:spPr>
+        <p:txBody>
+          <a:bodyPr wrap="square" rtlCol="0">
+            <a:spAutoFit/>
+          </a:bodyPr>
+          <a:lstStyle/>
+          <a:p>
+            <a:pPr algn="ctr"/>
+            <a:r>
+              <a:rPr lang="en-US" dirty="0"/>
+              <a:t>On-Premise SSIS Package</a:t>
+            </a:r>
+          </a:p>
+        </p:txBody>
+      </p:sp>
+      <p:cxnSp>
+        <p:nvCxnSpPr>
+          <p:cNvPr id="28" name="Straight Arrow Connector 27">
+            <a:extLst>
+              <a:ext uri="{FF2B5EF4-FFF2-40B4-BE49-F238E27FC236}">
+                <a16:creationId xmlns:a16="http://schemas.microsoft.com/office/drawing/2014/main" id="{66BEC8AF-97F5-4B7A-A196-654BF3330FFB}"/>
+              </a:ext>
+            </a:extLst>
+          </p:cNvPr>
+          <p:cNvCxnSpPr>
+            <a:endCxn id="25" idx="1"/>
+          </p:cNvCxnSpPr>
+          <p:nvPr/>
+        </p:nvCxnSpPr>
+        <p:spPr>
+          <a:xfrm>
+            <a:off x="2454537" y="1886149"/>
+            <a:ext cx="1504274" cy="2"/>
+          </a:xfrm>
+          <a:prstGeom prst="straightConnector1">
+            <a:avLst/>
+          </a:prstGeom>
+          <a:ln>
+            <a:tailEnd type="triangle"/>
+          </a:ln>
+        </p:spPr>
+        <p:style>
+          <a:lnRef idx="1">
+            <a:schemeClr val="accent1"/>
+          </a:lnRef>
+          <a:fillRef idx="0">
+            <a:schemeClr val="accent1"/>
+          </a:fillRef>
+          <a:effectRef idx="0">
+            <a:schemeClr val="accent1"/>
+          </a:effectRef>
+          <a:fontRef idx="minor">
+            <a:schemeClr val="tx1"/>
+          </a:fontRef>
+        </p:style>
+      </p:cxnSp>
+      <p:cxnSp>
+        <p:nvCxnSpPr>
+          <p:cNvPr id="30" name="Straight Arrow Connector 29">
+            <a:extLst>
+              <a:ext uri="{FF2B5EF4-FFF2-40B4-BE49-F238E27FC236}">
+                <a16:creationId xmlns:a16="http://schemas.microsoft.com/office/drawing/2014/main" id="{86C7AF45-B43A-4143-A95C-C20BB401A568}"/>
+              </a:ext>
+            </a:extLst>
+          </p:cNvPr>
+          <p:cNvCxnSpPr>
+            <a:stCxn id="25" idx="2"/>
+            <a:endCxn id="5" idx="0"/>
+          </p:cNvCxnSpPr>
+          <p:nvPr/>
+        </p:nvCxnSpPr>
+        <p:spPr>
+          <a:xfrm>
+            <a:off x="5120637" y="2548932"/>
+            <a:ext cx="2" cy="742904"/>
+          </a:xfrm>
+          <a:prstGeom prst="straightConnector1">
+            <a:avLst/>
+          </a:prstGeom>
+          <a:ln>
+            <a:tailEnd type="triangle"/>
+          </a:ln>
+        </p:spPr>
+        <p:style>
+          <a:lnRef idx="1">
+            <a:schemeClr val="accent1"/>
+          </a:lnRef>
+          <a:fillRef idx="0">
+            <a:schemeClr val="accent1"/>
+          </a:fillRef>
+          <a:effectRef idx="0">
+            <a:schemeClr val="accent1"/>
+          </a:effectRef>
+          <a:fontRef idx="minor">
+            <a:schemeClr val="tx1"/>
+          </a:fontRef>
+        </p:style>
+      </p:cxnSp>
     </p:spTree>
     <p:extLst>
       <p:ext uri="{BB962C8B-B14F-4D97-AF65-F5344CB8AC3E}">

</xml_diff>